<commit_message>
Update framework template & PreDesign.
</commit_message>
<xml_diff>
--- a/SystemDesignDocs/FiguresForDesign/Figures.pptx
+++ b/SystemDesignDocs/FiguresForDesign/Figures.pptx
@@ -258,7 +258,7 @@
           <a:p>
             <a:fld id="{BCF065E9-F0BD-4CBA-8514-7C9F3F1A00B0}" type="datetimeFigureOut">
               <a:rPr lang="en-US" smtClean="0"/>
-              <a:t>5/5/2022</a:t>
+              <a:t>5/10/2022</a:t>
             </a:fld>
             <a:endParaRPr lang="en-US"/>
           </a:p>
@@ -428,7 +428,7 @@
           <a:p>
             <a:fld id="{BCF065E9-F0BD-4CBA-8514-7C9F3F1A00B0}" type="datetimeFigureOut">
               <a:rPr lang="en-US" smtClean="0"/>
-              <a:t>5/5/2022</a:t>
+              <a:t>5/10/2022</a:t>
             </a:fld>
             <a:endParaRPr lang="en-US"/>
           </a:p>
@@ -608,7 +608,7 @@
           <a:p>
             <a:fld id="{BCF065E9-F0BD-4CBA-8514-7C9F3F1A00B0}" type="datetimeFigureOut">
               <a:rPr lang="en-US" smtClean="0"/>
-              <a:t>5/5/2022</a:t>
+              <a:t>5/10/2022</a:t>
             </a:fld>
             <a:endParaRPr lang="en-US"/>
           </a:p>
@@ -778,7 +778,7 @@
           <a:p>
             <a:fld id="{BCF065E9-F0BD-4CBA-8514-7C9F3F1A00B0}" type="datetimeFigureOut">
               <a:rPr lang="en-US" smtClean="0"/>
-              <a:t>5/5/2022</a:t>
+              <a:t>5/10/2022</a:t>
             </a:fld>
             <a:endParaRPr lang="en-US"/>
           </a:p>
@@ -1022,7 +1022,7 @@
           <a:p>
             <a:fld id="{BCF065E9-F0BD-4CBA-8514-7C9F3F1A00B0}" type="datetimeFigureOut">
               <a:rPr lang="en-US" smtClean="0"/>
-              <a:t>5/5/2022</a:t>
+              <a:t>5/10/2022</a:t>
             </a:fld>
             <a:endParaRPr lang="en-US"/>
           </a:p>
@@ -1254,7 +1254,7 @@
           <a:p>
             <a:fld id="{BCF065E9-F0BD-4CBA-8514-7C9F3F1A00B0}" type="datetimeFigureOut">
               <a:rPr lang="en-US" smtClean="0"/>
-              <a:t>5/5/2022</a:t>
+              <a:t>5/10/2022</a:t>
             </a:fld>
             <a:endParaRPr lang="en-US"/>
           </a:p>
@@ -1621,7 +1621,7 @@
           <a:p>
             <a:fld id="{BCF065E9-F0BD-4CBA-8514-7C9F3F1A00B0}" type="datetimeFigureOut">
               <a:rPr lang="en-US" smtClean="0"/>
-              <a:t>5/5/2022</a:t>
+              <a:t>5/10/2022</a:t>
             </a:fld>
             <a:endParaRPr lang="en-US"/>
           </a:p>
@@ -1739,7 +1739,7 @@
           <a:p>
             <a:fld id="{BCF065E9-F0BD-4CBA-8514-7C9F3F1A00B0}" type="datetimeFigureOut">
               <a:rPr lang="en-US" smtClean="0"/>
-              <a:t>5/5/2022</a:t>
+              <a:t>5/10/2022</a:t>
             </a:fld>
             <a:endParaRPr lang="en-US"/>
           </a:p>
@@ -1834,7 +1834,7 @@
           <a:p>
             <a:fld id="{BCF065E9-F0BD-4CBA-8514-7C9F3F1A00B0}" type="datetimeFigureOut">
               <a:rPr lang="en-US" smtClean="0"/>
-              <a:t>5/5/2022</a:t>
+              <a:t>5/10/2022</a:t>
             </a:fld>
             <a:endParaRPr lang="en-US"/>
           </a:p>
@@ -2111,7 +2111,7 @@
           <a:p>
             <a:fld id="{BCF065E9-F0BD-4CBA-8514-7C9F3F1A00B0}" type="datetimeFigureOut">
               <a:rPr lang="en-US" smtClean="0"/>
-              <a:t>5/5/2022</a:t>
+              <a:t>5/10/2022</a:t>
             </a:fld>
             <a:endParaRPr lang="en-US"/>
           </a:p>
@@ -2368,7 +2368,7 @@
           <a:p>
             <a:fld id="{BCF065E9-F0BD-4CBA-8514-7C9F3F1A00B0}" type="datetimeFigureOut">
               <a:rPr lang="en-US" smtClean="0"/>
-              <a:t>5/5/2022</a:t>
+              <a:t>5/10/2022</a:t>
             </a:fld>
             <a:endParaRPr lang="en-US"/>
           </a:p>
@@ -2581,7 +2581,7 @@
           <a:p>
             <a:fld id="{BCF065E9-F0BD-4CBA-8514-7C9F3F1A00B0}" type="datetimeFigureOut">
               <a:rPr lang="en-US" smtClean="0"/>
-              <a:t>5/5/2022</a:t>
+              <a:t>5/10/2022</a:t>
             </a:fld>
             <a:endParaRPr lang="en-US"/>
           </a:p>
@@ -4684,12 +4684,12 @@
         </p:nvCxnSpPr>
         <p:spPr>
           <a:xfrm rot="5400000" flipH="1" flipV="1">
-            <a:off x="3950336" y="9943884"/>
-            <a:ext cx="1164935" cy="1577682"/>
+            <a:off x="3954146" y="9940076"/>
+            <a:ext cx="1164933" cy="1585300"/>
           </a:xfrm>
           <a:prstGeom prst="bentConnector3">
             <a:avLst>
-              <a:gd name="adj1" fmla="val 7264"/>
+              <a:gd name="adj1" fmla="val 6828"/>
             </a:avLst>
           </a:prstGeom>
           <a:ln w="12700">
@@ -4732,12 +4732,12 @@
         </p:nvCxnSpPr>
         <p:spPr>
           <a:xfrm rot="16200000" flipV="1">
-            <a:off x="4819284" y="10652620"/>
-            <a:ext cx="1164935" cy="160213"/>
+            <a:off x="4823093" y="10656429"/>
+            <a:ext cx="1164933" cy="152593"/>
           </a:xfrm>
           <a:prstGeom prst="bentConnector3">
             <a:avLst>
-              <a:gd name="adj1" fmla="val 7265"/>
+              <a:gd name="adj1" fmla="val 6828"/>
             </a:avLst>
           </a:prstGeom>
           <a:ln w="12700">
@@ -4875,7 +4875,7 @@
         </p:nvSpPr>
         <p:spPr>
           <a:xfrm>
-            <a:off x="4436537" y="9874682"/>
+            <a:off x="4444157" y="9874682"/>
             <a:ext cx="1770210" cy="275577"/>
           </a:xfrm>
           <a:prstGeom prst="roundRect">
@@ -5116,7 +5116,7 @@
         </p:nvSpPr>
         <p:spPr>
           <a:xfrm>
-            <a:off x="4675278" y="9142805"/>
+            <a:off x="4682898" y="9142805"/>
             <a:ext cx="1282571" cy="454827"/>
           </a:xfrm>
           <a:prstGeom prst="roundRect">
@@ -5354,12 +5354,12 @@
         </p:nvCxnSpPr>
         <p:spPr>
           <a:xfrm rot="16200000" flipV="1">
-            <a:off x="4440144" y="8993182"/>
-            <a:ext cx="276978" cy="1486018"/>
+            <a:off x="4443954" y="8989374"/>
+            <a:ext cx="276978" cy="1493638"/>
           </a:xfrm>
           <a:prstGeom prst="bentConnector3">
             <a:avLst>
-              <a:gd name="adj1" fmla="val 42664"/>
+              <a:gd name="adj1" fmla="val 50000"/>
             </a:avLst>
           </a:prstGeom>
           <a:ln w="12700">
@@ -5402,8 +5402,8 @@
         </p:nvCxnSpPr>
         <p:spPr>
           <a:xfrm rot="16200000" flipV="1">
-            <a:off x="5180577" y="9733615"/>
-            <a:ext cx="277050" cy="5080"/>
+            <a:off x="5188198" y="9733618"/>
+            <a:ext cx="277050" cy="5078"/>
           </a:xfrm>
           <a:prstGeom prst="bentConnector3">
             <a:avLst>
@@ -5450,12 +5450,12 @@
         </p:nvCxnSpPr>
         <p:spPr>
           <a:xfrm rot="5400000" flipH="1" flipV="1">
-            <a:off x="5922142" y="8997130"/>
-            <a:ext cx="277050" cy="1478050"/>
+            <a:off x="5925952" y="9000942"/>
+            <a:ext cx="277050" cy="1470430"/>
           </a:xfrm>
           <a:prstGeom prst="bentConnector3">
             <a:avLst>
-              <a:gd name="adj1" fmla="val 42666"/>
+              <a:gd name="adj1" fmla="val 50000"/>
             </a:avLst>
           </a:prstGeom>
           <a:ln w="12700">
@@ -5555,7 +5555,7 @@
         <p:spPr>
           <a:xfrm>
             <a:off x="3044313" y="7379320"/>
-            <a:ext cx="4551238" cy="1512045"/>
+            <a:ext cx="4551238" cy="1428875"/>
           </a:xfrm>
           <a:prstGeom prst="rect">
             <a:avLst/>
@@ -5607,7 +5607,7 @@
         </p:nvSpPr>
         <p:spPr>
           <a:xfrm>
-            <a:off x="4434665" y="8358174"/>
+            <a:off x="4434665" y="8243874"/>
             <a:ext cx="799687" cy="302748"/>
           </a:xfrm>
           <a:prstGeom prst="roundRect">
@@ -5667,7 +5667,7 @@
         </p:nvSpPr>
         <p:spPr>
           <a:xfrm>
-            <a:off x="5407062" y="8358174"/>
+            <a:off x="5407062" y="8243874"/>
             <a:ext cx="799687" cy="302748"/>
           </a:xfrm>
           <a:prstGeom prst="roundRect">
@@ -5727,7 +5727,7 @@
         </p:nvSpPr>
         <p:spPr>
           <a:xfrm>
-            <a:off x="4289238" y="8248856"/>
+            <a:off x="4289238" y="8134556"/>
             <a:ext cx="2078215" cy="509766"/>
           </a:xfrm>
           <a:prstGeom prst="rect">
@@ -5777,15 +5777,15 @@
           </p:cNvPr>
           <p:cNvCxnSpPr>
             <a:cxnSpLocks/>
-            <a:stCxn id="36" idx="0"/>
+            <a:stCxn id="56" idx="0"/>
             <a:endCxn id="76" idx="2"/>
           </p:cNvCxnSpPr>
           <p:nvPr/>
         </p:nvCxnSpPr>
         <p:spPr>
-          <a:xfrm rot="16200000" flipV="1">
-            <a:off x="5208698" y="8878270"/>
-            <a:ext cx="240090" cy="797"/>
+          <a:xfrm rot="5400000" flipH="1" flipV="1">
+            <a:off x="5077024" y="8891483"/>
+            <a:ext cx="498483" cy="4162"/>
           </a:xfrm>
           <a:prstGeom prst="bentConnector3">
             <a:avLst>
@@ -5814,55 +5814,6 @@
           </a:fontRef>
         </p:style>
       </p:cxnSp>
-      <p:sp>
-        <p:nvSpPr>
-          <p:cNvPr id="80" name="TextBox 79">
-            <a:extLst>
-              <a:ext uri="{FF2B5EF4-FFF2-40B4-BE49-F238E27FC236}">
-                <a16:creationId xmlns:a16="http://schemas.microsoft.com/office/drawing/2014/main" id="{4B6173F9-1507-44B3-8532-0D9AEE7FA30E}"/>
-              </a:ext>
-            </a:extLst>
-          </p:cNvPr>
-          <p:cNvSpPr txBox="1"/>
-          <p:nvPr/>
-        </p:nvSpPr>
-        <p:spPr>
-          <a:xfrm>
-            <a:off x="4132097" y="7995287"/>
-            <a:ext cx="799687" cy="246221"/>
-          </a:xfrm>
-          <a:prstGeom prst="rect">
-            <a:avLst/>
-          </a:prstGeom>
-          <a:noFill/>
-        </p:spPr>
-        <p:txBody>
-          <a:bodyPr wrap="square" rtlCol="0">
-            <a:spAutoFit/>
-          </a:bodyPr>
-          <a:lstStyle/>
-          <a:p>
-            <a:pPr algn="ctr"/>
-            <a:r>
-              <a:rPr lang="zh-CN" altLang="en-US" sz="1000" b="1" dirty="0">
-                <a:solidFill>
-                  <a:schemeClr val="accent6">
-                    <a:lumMod val="50000"/>
-                  </a:schemeClr>
-                </a:solidFill>
-              </a:rPr>
-              <a:t>实体链接</a:t>
-            </a:r>
-            <a:endParaRPr lang="en-US" sz="1000" b="1" dirty="0">
-              <a:solidFill>
-                <a:schemeClr val="accent6">
-                  <a:lumMod val="50000"/>
-                </a:schemeClr>
-              </a:solidFill>
-            </a:endParaRPr>
-          </a:p>
-        </p:txBody>
-      </p:sp>
       <p:sp>
         <p:nvSpPr>
           <p:cNvPr id="81" name="Rectangle: Rounded Corners 80">
@@ -5986,8 +5937,8 @@
         </p:nvCxnSpPr>
         <p:spPr>
           <a:xfrm rot="16200000" flipH="1">
-            <a:off x="5131002" y="8051513"/>
-            <a:ext cx="393065" cy="1623"/>
+            <a:off x="5188153" y="7994362"/>
+            <a:ext cx="278763" cy="1623"/>
           </a:xfrm>
           <a:prstGeom prst="bentConnector3">
             <a:avLst>
@@ -6251,7 +6202,7 @@
         <p:spPr>
           <a:xfrm rot="10800000">
             <a:off x="3572988" y="6838347"/>
-            <a:ext cx="716251" cy="1665395"/>
+            <a:ext cx="716251" cy="1551093"/>
           </a:xfrm>
           <a:prstGeom prst="bentConnector3">
             <a:avLst>
@@ -6418,13 +6369,13 @@
         </p:nvCxnSpPr>
         <p:spPr>
           <a:xfrm rot="10800000" flipH="1">
-            <a:off x="4289237" y="6981173"/>
-            <a:ext cx="1037485" cy="1522566"/>
+            <a:off x="4289237" y="6981175"/>
+            <a:ext cx="1037485" cy="1408264"/>
           </a:xfrm>
           <a:prstGeom prst="bentConnector4">
             <a:avLst>
               <a:gd name="adj1" fmla="val -91074"/>
-              <a:gd name="adj2" fmla="val 88732"/>
+              <a:gd name="adj2" fmla="val 89351"/>
             </a:avLst>
           </a:prstGeom>
           <a:ln w="12700">
@@ -7921,6 +7872,102 @@
           </a:p>
         </p:txBody>
       </p:sp>
+      <p:cxnSp>
+        <p:nvCxnSpPr>
+          <p:cNvPr id="100" name="Connector: Elbow 99">
+            <a:extLst>
+              <a:ext uri="{FF2B5EF4-FFF2-40B4-BE49-F238E27FC236}">
+                <a16:creationId xmlns:a16="http://schemas.microsoft.com/office/drawing/2014/main" id="{6F6DA65A-38B4-2008-07C3-4003ABEDAEE8}"/>
+              </a:ext>
+            </a:extLst>
+          </p:cNvPr>
+          <p:cNvCxnSpPr>
+            <a:cxnSpLocks/>
+            <a:stCxn id="57" idx="0"/>
+            <a:endCxn id="76" idx="2"/>
+          </p:cNvCxnSpPr>
+          <p:nvPr/>
+        </p:nvCxnSpPr>
+        <p:spPr>
+          <a:xfrm rot="16200000" flipV="1">
+            <a:off x="5821029" y="8151640"/>
+            <a:ext cx="485981" cy="1471346"/>
+          </a:xfrm>
+          <a:prstGeom prst="bentConnector3">
+            <a:avLst>
+              <a:gd name="adj1" fmla="val 43728"/>
+            </a:avLst>
+          </a:prstGeom>
+          <a:ln w="12700">
+            <a:solidFill>
+              <a:srgbClr val="FF0000"/>
+            </a:solidFill>
+            <a:tailEnd type="triangle"/>
+          </a:ln>
+        </p:spPr>
+        <p:style>
+          <a:lnRef idx="1">
+            <a:schemeClr val="accent1"/>
+          </a:lnRef>
+          <a:fillRef idx="0">
+            <a:schemeClr val="accent1"/>
+          </a:fillRef>
+          <a:effectRef idx="0">
+            <a:schemeClr val="accent1"/>
+          </a:effectRef>
+          <a:fontRef idx="minor">
+            <a:schemeClr val="tx1"/>
+          </a:fontRef>
+        </p:style>
+      </p:cxnSp>
+      <p:cxnSp>
+        <p:nvCxnSpPr>
+          <p:cNvPr id="102" name="Connector: Elbow 101">
+            <a:extLst>
+              <a:ext uri="{FF2B5EF4-FFF2-40B4-BE49-F238E27FC236}">
+                <a16:creationId xmlns:a16="http://schemas.microsoft.com/office/drawing/2014/main" id="{1F0F1586-C31C-783D-4E13-2EDC5A4B1383}"/>
+              </a:ext>
+            </a:extLst>
+          </p:cNvPr>
+          <p:cNvCxnSpPr>
+            <a:cxnSpLocks/>
+            <a:stCxn id="47" idx="0"/>
+            <a:endCxn id="76" idx="2"/>
+          </p:cNvCxnSpPr>
+          <p:nvPr/>
+        </p:nvCxnSpPr>
+        <p:spPr>
+          <a:xfrm rot="5400000" flipH="1" flipV="1">
+            <a:off x="4338959" y="8140988"/>
+            <a:ext cx="486053" cy="1492722"/>
+          </a:xfrm>
+          <a:prstGeom prst="bentConnector3">
+            <a:avLst>
+              <a:gd name="adj1" fmla="val 45297"/>
+            </a:avLst>
+          </a:prstGeom>
+          <a:ln w="12700">
+            <a:solidFill>
+              <a:srgbClr val="FF0000"/>
+            </a:solidFill>
+            <a:tailEnd type="triangle"/>
+          </a:ln>
+        </p:spPr>
+        <p:style>
+          <a:lnRef idx="1">
+            <a:schemeClr val="accent1"/>
+          </a:lnRef>
+          <a:fillRef idx="0">
+            <a:schemeClr val="accent1"/>
+          </a:fillRef>
+          <a:effectRef idx="0">
+            <a:schemeClr val="accent1"/>
+          </a:effectRef>
+          <a:fontRef idx="minor">
+            <a:schemeClr val="tx1"/>
+          </a:fontRef>
+        </p:style>
+      </p:cxnSp>
     </p:spTree>
     <p:extLst>
       <p:ext uri="{BB962C8B-B14F-4D97-AF65-F5344CB8AC3E}">

</xml_diff>

<commit_message>
Modified frameworks & predesign.
</commit_message>
<xml_diff>
--- a/SystemDesignDocs/FiguresForDesign/Figures.pptx
+++ b/SystemDesignDocs/FiguresForDesign/Figures.pptx
@@ -259,7 +259,7 @@
           <a:p>
             <a:fld id="{BCF065E9-F0BD-4CBA-8514-7C9F3F1A00B0}" type="datetimeFigureOut">
               <a:rPr lang="en-US" smtClean="0"/>
-              <a:t>5/21/2022</a:t>
+              <a:t>5/23/2022</a:t>
             </a:fld>
             <a:endParaRPr lang="en-US"/>
           </a:p>
@@ -429,7 +429,7 @@
           <a:p>
             <a:fld id="{BCF065E9-F0BD-4CBA-8514-7C9F3F1A00B0}" type="datetimeFigureOut">
               <a:rPr lang="en-US" smtClean="0"/>
-              <a:t>5/21/2022</a:t>
+              <a:t>5/23/2022</a:t>
             </a:fld>
             <a:endParaRPr lang="en-US"/>
           </a:p>
@@ -609,7 +609,7 @@
           <a:p>
             <a:fld id="{BCF065E9-F0BD-4CBA-8514-7C9F3F1A00B0}" type="datetimeFigureOut">
               <a:rPr lang="en-US" smtClean="0"/>
-              <a:t>5/21/2022</a:t>
+              <a:t>5/23/2022</a:t>
             </a:fld>
             <a:endParaRPr lang="en-US"/>
           </a:p>
@@ -779,7 +779,7 @@
           <a:p>
             <a:fld id="{BCF065E9-F0BD-4CBA-8514-7C9F3F1A00B0}" type="datetimeFigureOut">
               <a:rPr lang="en-US" smtClean="0"/>
-              <a:t>5/21/2022</a:t>
+              <a:t>5/23/2022</a:t>
             </a:fld>
             <a:endParaRPr lang="en-US"/>
           </a:p>
@@ -1023,7 +1023,7 @@
           <a:p>
             <a:fld id="{BCF065E9-F0BD-4CBA-8514-7C9F3F1A00B0}" type="datetimeFigureOut">
               <a:rPr lang="en-US" smtClean="0"/>
-              <a:t>5/21/2022</a:t>
+              <a:t>5/23/2022</a:t>
             </a:fld>
             <a:endParaRPr lang="en-US"/>
           </a:p>
@@ -1255,7 +1255,7 @@
           <a:p>
             <a:fld id="{BCF065E9-F0BD-4CBA-8514-7C9F3F1A00B0}" type="datetimeFigureOut">
               <a:rPr lang="en-US" smtClean="0"/>
-              <a:t>5/21/2022</a:t>
+              <a:t>5/23/2022</a:t>
             </a:fld>
             <a:endParaRPr lang="en-US"/>
           </a:p>
@@ -1622,7 +1622,7 @@
           <a:p>
             <a:fld id="{BCF065E9-F0BD-4CBA-8514-7C9F3F1A00B0}" type="datetimeFigureOut">
               <a:rPr lang="en-US" smtClean="0"/>
-              <a:t>5/21/2022</a:t>
+              <a:t>5/23/2022</a:t>
             </a:fld>
             <a:endParaRPr lang="en-US"/>
           </a:p>
@@ -1740,7 +1740,7 @@
           <a:p>
             <a:fld id="{BCF065E9-F0BD-4CBA-8514-7C9F3F1A00B0}" type="datetimeFigureOut">
               <a:rPr lang="en-US" smtClean="0"/>
-              <a:t>5/21/2022</a:t>
+              <a:t>5/23/2022</a:t>
             </a:fld>
             <a:endParaRPr lang="en-US"/>
           </a:p>
@@ -1835,7 +1835,7 @@
           <a:p>
             <a:fld id="{BCF065E9-F0BD-4CBA-8514-7C9F3F1A00B0}" type="datetimeFigureOut">
               <a:rPr lang="en-US" smtClean="0"/>
-              <a:t>5/21/2022</a:t>
+              <a:t>5/23/2022</a:t>
             </a:fld>
             <a:endParaRPr lang="en-US"/>
           </a:p>
@@ -2112,7 +2112,7 @@
           <a:p>
             <a:fld id="{BCF065E9-F0BD-4CBA-8514-7C9F3F1A00B0}" type="datetimeFigureOut">
               <a:rPr lang="en-US" smtClean="0"/>
-              <a:t>5/21/2022</a:t>
+              <a:t>5/23/2022</a:t>
             </a:fld>
             <a:endParaRPr lang="en-US"/>
           </a:p>
@@ -2369,7 +2369,7 @@
           <a:p>
             <a:fld id="{BCF065E9-F0BD-4CBA-8514-7C9F3F1A00B0}" type="datetimeFigureOut">
               <a:rPr lang="en-US" smtClean="0"/>
-              <a:t>5/21/2022</a:t>
+              <a:t>5/23/2022</a:t>
             </a:fld>
             <a:endParaRPr lang="en-US"/>
           </a:p>
@@ -2582,7 +2582,7 @@
           <a:p>
             <a:fld id="{BCF065E9-F0BD-4CBA-8514-7C9F3F1A00B0}" type="datetimeFigureOut">
               <a:rPr lang="en-US" smtClean="0"/>
-              <a:t>5/21/2022</a:t>
+              <a:t>5/23/2022</a:t>
             </a:fld>
             <a:endParaRPr lang="en-US"/>
           </a:p>
@@ -3001,7 +3001,7 @@
         </p:nvSpPr>
         <p:spPr>
           <a:xfrm>
-            <a:off x="1828462" y="3103448"/>
+            <a:off x="1828462" y="2385898"/>
             <a:ext cx="2161682" cy="369332"/>
           </a:xfrm>
           <a:prstGeom prst="rect">
@@ -3025,7 +3025,7 @@
             </a:r>
             <a:r>
               <a:rPr lang="en-US" dirty="0"/>
-              <a:t>- 20220521</a:t>
+              <a:t>- 20220523</a:t>
             </a:r>
           </a:p>
         </p:txBody>
@@ -4457,8 +4457,8 @@
         </p:nvSpPr>
         <p:spPr>
           <a:xfrm>
-            <a:off x="2560320" y="5697070"/>
-            <a:ext cx="5577840" cy="5338054"/>
+            <a:off x="2560320" y="5037955"/>
+            <a:ext cx="5577840" cy="5997169"/>
           </a:xfrm>
           <a:prstGeom prst="rect">
             <a:avLst/>
@@ -5555,8 +5555,8 @@
         </p:nvSpPr>
         <p:spPr>
           <a:xfrm>
-            <a:off x="3044313" y="7379320"/>
-            <a:ext cx="4551238" cy="1428875"/>
+            <a:off x="3044313" y="6718452"/>
+            <a:ext cx="4551238" cy="2022352"/>
           </a:xfrm>
           <a:prstGeom prst="rect">
             <a:avLst/>
@@ -5608,7 +5608,7 @@
         </p:nvSpPr>
         <p:spPr>
           <a:xfrm>
-            <a:off x="4343225" y="8243874"/>
+            <a:off x="4343225" y="8186724"/>
             <a:ext cx="799687" cy="302748"/>
           </a:xfrm>
           <a:prstGeom prst="roundRect">
@@ -5668,7 +5668,7 @@
         </p:nvSpPr>
         <p:spPr>
           <a:xfrm>
-            <a:off x="5295177" y="8243874"/>
+            <a:off x="5295177" y="8186724"/>
             <a:ext cx="1037486" cy="302748"/>
           </a:xfrm>
           <a:prstGeom prst="roundRect">
@@ -5744,7 +5744,7 @@
         </p:nvSpPr>
         <p:spPr>
           <a:xfrm>
-            <a:off x="4197798" y="8134556"/>
+            <a:off x="4197798" y="8077406"/>
             <a:ext cx="2252071" cy="509766"/>
           </a:xfrm>
           <a:prstGeom prst="rect">
@@ -5801,8 +5801,8 @@
         </p:nvCxnSpPr>
         <p:spPr>
           <a:xfrm rot="16200000" flipV="1">
-            <a:off x="5074768" y="8893389"/>
-            <a:ext cx="498483" cy="350"/>
+            <a:off x="5046193" y="8864814"/>
+            <a:ext cx="555633" cy="350"/>
           </a:xfrm>
           <a:prstGeom prst="bentConnector3">
             <a:avLst>
@@ -5831,66 +5831,6 @@
           </a:fontRef>
         </p:style>
       </p:cxnSp>
-      <p:sp>
-        <p:nvSpPr>
-          <p:cNvPr id="81" name="Rectangle: Rounded Corners 80">
-            <a:extLst>
-              <a:ext uri="{FF2B5EF4-FFF2-40B4-BE49-F238E27FC236}">
-                <a16:creationId xmlns:a16="http://schemas.microsoft.com/office/drawing/2014/main" id="{0680DED7-E511-420C-8EB5-86A5EAF4089C}"/>
-              </a:ext>
-            </a:extLst>
-          </p:cNvPr>
-          <p:cNvSpPr/>
-          <p:nvPr/>
-        </p:nvSpPr>
-        <p:spPr>
-          <a:xfrm>
-            <a:off x="4863582" y="7567840"/>
-            <a:ext cx="926281" cy="287953"/>
-          </a:xfrm>
-          <a:prstGeom prst="roundRect">
-            <a:avLst/>
-          </a:prstGeom>
-          <a:ln>
-            <a:headEnd type="none" w="med" len="med"/>
-            <a:tailEnd type="none" w="med" len="med"/>
-          </a:ln>
-        </p:spPr>
-        <p:style>
-          <a:lnRef idx="1">
-            <a:schemeClr val="accent1"/>
-          </a:lnRef>
-          <a:fillRef idx="2">
-            <a:schemeClr val="accent1"/>
-          </a:fillRef>
-          <a:effectRef idx="1">
-            <a:schemeClr val="accent1"/>
-          </a:effectRef>
-          <a:fontRef idx="minor">
-            <a:schemeClr val="dk1"/>
-          </a:fontRef>
-        </p:style>
-        <p:txBody>
-          <a:bodyPr rtlCol="0" anchor="ctr"/>
-          <a:lstStyle/>
-          <a:p>
-            <a:pPr algn="ctr"/>
-            <a:r>
-              <a:rPr lang="zh-CN" altLang="en-US" sz="1000" b="1" dirty="0">
-                <a:solidFill>
-                  <a:schemeClr val="tx1"/>
-                </a:solidFill>
-              </a:rPr>
-              <a:t>知识合并</a:t>
-            </a:r>
-            <a:endParaRPr lang="en-US" sz="1000" b="1" dirty="0">
-              <a:solidFill>
-                <a:schemeClr val="tx1"/>
-              </a:solidFill>
-            </a:endParaRPr>
-          </a:p>
-        </p:txBody>
-      </p:sp>
       <p:cxnSp>
         <p:nvCxnSpPr>
           <p:cNvPr id="82" name="Connector: Elbow 81">
@@ -5908,7 +5848,7 @@
         </p:nvCxnSpPr>
         <p:spPr>
           <a:xfrm rot="16200000" flipV="1">
-            <a:off x="4806494" y="8695185"/>
+            <a:off x="4806494" y="7977635"/>
             <a:ext cx="3625823" cy="1659084"/>
           </a:xfrm>
           <a:prstGeom prst="bentConnector2">
@@ -5948,14 +5888,14 @@
           <p:cNvCxnSpPr>
             <a:cxnSpLocks/>
             <a:stCxn id="81" idx="2"/>
-            <a:endCxn id="76" idx="0"/>
+            <a:endCxn id="107" idx="0"/>
           </p:cNvCxnSpPr>
           <p:nvPr/>
         </p:nvCxnSpPr>
         <p:spPr>
           <a:xfrm rot="5400000">
-            <a:off x="5185898" y="7993730"/>
-            <a:ext cx="278763" cy="2889"/>
+            <a:off x="5182337" y="7280663"/>
+            <a:ext cx="286806" cy="1966"/>
           </a:xfrm>
           <a:prstGeom prst="bentConnector3">
             <a:avLst>
@@ -5998,7 +5938,7 @@
         </p:nvSpPr>
         <p:spPr>
           <a:xfrm>
-            <a:off x="3565123" y="7517038"/>
+            <a:off x="3565123" y="6799488"/>
             <a:ext cx="850040" cy="393066"/>
           </a:xfrm>
           <a:prstGeom prst="flowChartMagneticDisk">
@@ -6057,7 +5997,7 @@
         </p:nvCxnSpPr>
         <p:spPr>
           <a:xfrm flipV="1">
-            <a:off x="4415165" y="7711815"/>
+            <a:off x="4415165" y="6994265"/>
             <a:ext cx="448417" cy="1756"/>
           </a:xfrm>
           <a:prstGeom prst="bentConnector3">
@@ -6101,7 +6041,7 @@
         </p:nvSpPr>
         <p:spPr>
           <a:xfrm>
-            <a:off x="3040942" y="6505831"/>
+            <a:off x="3040942" y="5788281"/>
             <a:ext cx="4551238" cy="764168"/>
           </a:xfrm>
           <a:prstGeom prst="rect">
@@ -6154,7 +6094,7 @@
         </p:nvSpPr>
         <p:spPr>
           <a:xfrm>
-            <a:off x="2408056" y="6657084"/>
+            <a:off x="2408056" y="5939534"/>
             <a:ext cx="799687" cy="461665"/>
           </a:xfrm>
           <a:prstGeom prst="rect">
@@ -6218,8 +6158,8 @@
         </p:nvCxnSpPr>
         <p:spPr>
           <a:xfrm rot="10800000">
-            <a:off x="3572988" y="6838347"/>
-            <a:ext cx="624811" cy="1551093"/>
+            <a:off x="3572988" y="6120797"/>
+            <a:ext cx="624811" cy="2211493"/>
           </a:xfrm>
           <a:prstGeom prst="bentConnector3">
             <a:avLst>
@@ -6262,7 +6202,7 @@
         </p:nvSpPr>
         <p:spPr>
           <a:xfrm>
-            <a:off x="4863582" y="6693222"/>
+            <a:off x="4863582" y="5975672"/>
             <a:ext cx="926281" cy="287953"/>
           </a:xfrm>
           <a:prstGeom prst="roundRect">
@@ -6322,7 +6262,7 @@
         </p:nvSpPr>
         <p:spPr>
           <a:xfrm>
-            <a:off x="3572987" y="6694369"/>
+            <a:off x="3572987" y="5976819"/>
             <a:ext cx="926281" cy="287953"/>
           </a:xfrm>
           <a:prstGeom prst="roundRect">
@@ -6386,13 +6326,13 @@
         </p:nvCxnSpPr>
         <p:spPr>
           <a:xfrm rot="10800000" flipH="1">
-            <a:off x="4197797" y="6981175"/>
-            <a:ext cx="1128925" cy="1408264"/>
+            <a:off x="4197797" y="6263625"/>
+            <a:ext cx="1128925" cy="2068664"/>
           </a:xfrm>
           <a:prstGeom prst="bentConnector4">
             <a:avLst>
-              <a:gd name="adj1" fmla="val -75597"/>
-              <a:gd name="adj2" fmla="val 89351"/>
+              <a:gd name="adj1" fmla="val -75372"/>
+              <a:gd name="adj2" fmla="val 91769"/>
             </a:avLst>
           </a:prstGeom>
           <a:ln w="12700">
@@ -6435,7 +6375,7 @@
         </p:nvCxnSpPr>
         <p:spPr>
           <a:xfrm flipV="1">
-            <a:off x="4499266" y="6837199"/>
+            <a:off x="4499266" y="6119649"/>
             <a:ext cx="364314" cy="1147"/>
           </a:xfrm>
           <a:prstGeom prst="bentConnector3">
@@ -6479,7 +6419,7 @@
         </p:nvSpPr>
         <p:spPr>
           <a:xfrm>
-            <a:off x="6160550" y="6694604"/>
+            <a:off x="6160550" y="5977054"/>
             <a:ext cx="926281" cy="287953"/>
           </a:xfrm>
           <a:prstGeom prst="roundRect">
@@ -6543,7 +6483,7 @@
         </p:nvCxnSpPr>
         <p:spPr>
           <a:xfrm rot="10800000">
-            <a:off x="5789864" y="6837197"/>
+            <a:off x="5789864" y="6119647"/>
             <a:ext cx="370687" cy="1382"/>
           </a:xfrm>
           <a:prstGeom prst="bentConnector3">
@@ -6591,8 +6531,8 @@
         </p:nvCxnSpPr>
         <p:spPr>
           <a:xfrm rot="16200000" flipV="1">
-            <a:off x="5138300" y="6504798"/>
-            <a:ext cx="375253" cy="1595"/>
+            <a:off x="5157349" y="5806297"/>
+            <a:ext cx="337153" cy="1597"/>
           </a:xfrm>
           <a:prstGeom prst="bentConnector3">
             <a:avLst>
@@ -6635,7 +6575,7 @@
         </p:nvSpPr>
         <p:spPr>
           <a:xfrm>
-            <a:off x="4810760" y="5827876"/>
+            <a:off x="4810760" y="5148426"/>
             <a:ext cx="1028732" cy="490093"/>
           </a:xfrm>
           <a:prstGeom prst="flowChartMagneticDisk">
@@ -6694,8 +6634,8 @@
         </p:nvCxnSpPr>
         <p:spPr>
           <a:xfrm>
-            <a:off x="5839494" y="6072923"/>
-            <a:ext cx="784197" cy="621681"/>
+            <a:off x="5839492" y="5393473"/>
+            <a:ext cx="784199" cy="583581"/>
           </a:xfrm>
           <a:prstGeom prst="bentConnector2">
             <a:avLst/>
@@ -6736,7 +6676,7 @@
         </p:nvSpPr>
         <p:spPr>
           <a:xfrm>
-            <a:off x="1604937" y="4675367"/>
+            <a:off x="1604937" y="3957817"/>
             <a:ext cx="819256" cy="584775"/>
           </a:xfrm>
           <a:prstGeom prst="rect">
@@ -6780,7 +6720,7 @@
         </p:nvSpPr>
         <p:spPr>
           <a:xfrm>
-            <a:off x="2554796" y="4333461"/>
+            <a:off x="2554796" y="3615911"/>
             <a:ext cx="5577839" cy="1268589"/>
           </a:xfrm>
           <a:prstGeom prst="rect">
@@ -6833,7 +6773,7 @@
         </p:nvSpPr>
         <p:spPr>
           <a:xfrm>
-            <a:off x="3342078" y="4683197"/>
+            <a:off x="3342078" y="3965647"/>
             <a:ext cx="818211" cy="246453"/>
           </a:xfrm>
           <a:prstGeom prst="roundRect">
@@ -6893,7 +6833,7 @@
         </p:nvSpPr>
         <p:spPr>
           <a:xfrm>
-            <a:off x="3334892" y="5257845"/>
+            <a:off x="3334892" y="4540295"/>
             <a:ext cx="819256" cy="246453"/>
           </a:xfrm>
           <a:prstGeom prst="roundRect">
@@ -6953,7 +6893,7 @@
         </p:nvSpPr>
         <p:spPr>
           <a:xfrm>
-            <a:off x="3334892" y="4968812"/>
+            <a:off x="3334892" y="4251262"/>
             <a:ext cx="819256" cy="246453"/>
           </a:xfrm>
           <a:prstGeom prst="roundRect">
@@ -7013,7 +6953,7 @@
         </p:nvSpPr>
         <p:spPr>
           <a:xfrm>
-            <a:off x="4748633" y="4469048"/>
+            <a:off x="4748633" y="3751498"/>
             <a:ext cx="1139131" cy="246453"/>
           </a:xfrm>
           <a:prstGeom prst="roundRect">
@@ -7075,7 +7015,7 @@
         </p:nvCxnSpPr>
         <p:spPr>
           <a:xfrm flipH="1" flipV="1">
-            <a:off x="5318197" y="4741614"/>
+            <a:off x="5318197" y="4024064"/>
             <a:ext cx="110" cy="223431"/>
           </a:xfrm>
           <a:prstGeom prst="straightConnector1">
@@ -7119,7 +7059,7 @@
         </p:nvCxnSpPr>
         <p:spPr>
           <a:xfrm>
-            <a:off x="4326874" y="5097123"/>
+            <a:off x="4326874" y="4379573"/>
             <a:ext cx="228512" cy="0"/>
           </a:xfrm>
           <a:prstGeom prst="straightConnector1">
@@ -7163,7 +7103,7 @@
         </p:nvCxnSpPr>
         <p:spPr>
           <a:xfrm flipV="1">
-            <a:off x="5315828" y="4165209"/>
+            <a:off x="5315828" y="3447659"/>
             <a:ext cx="0" cy="303839"/>
           </a:xfrm>
           <a:prstGeom prst="straightConnector1">
@@ -7205,7 +7145,7 @@
         </p:nvSpPr>
         <p:spPr>
           <a:xfrm>
-            <a:off x="1604937" y="3620269"/>
+            <a:off x="1604937" y="2902719"/>
             <a:ext cx="819256" cy="584775"/>
           </a:xfrm>
           <a:prstGeom prst="rect">
@@ -7249,7 +7189,7 @@
         </p:nvSpPr>
         <p:spPr>
           <a:xfrm>
-            <a:off x="2554795" y="3641441"/>
+            <a:off x="2554795" y="2923891"/>
             <a:ext cx="5577838" cy="516604"/>
           </a:xfrm>
           <a:prstGeom prst="rect">
@@ -7302,7 +7242,7 @@
         </p:nvSpPr>
         <p:spPr>
           <a:xfrm>
-            <a:off x="4780082" y="4962871"/>
+            <a:off x="4780082" y="4245321"/>
             <a:ext cx="1082348" cy="307777"/>
           </a:xfrm>
           <a:prstGeom prst="rect">
@@ -7352,7 +7292,7 @@
         </p:nvSpPr>
         <p:spPr>
           <a:xfrm>
-            <a:off x="4527803" y="3758769"/>
+            <a:off x="4527803" y="3041219"/>
             <a:ext cx="1383712" cy="307777"/>
           </a:xfrm>
           <a:prstGeom prst="rect">
@@ -7428,8 +7368,8 @@
         </p:nvCxnSpPr>
         <p:spPr>
           <a:xfrm rot="16200000" flipV="1">
-            <a:off x="5044577" y="5547325"/>
-            <a:ext cx="557228" cy="3870"/>
+            <a:off x="5025527" y="4848827"/>
+            <a:ext cx="595328" cy="3870"/>
           </a:xfrm>
           <a:prstGeom prst="bentConnector3">
             <a:avLst>
@@ -7863,8 +7803,8 @@
         </p:nvCxnSpPr>
         <p:spPr>
           <a:xfrm rot="16200000" flipV="1">
-            <a:off x="5818773" y="8149384"/>
-            <a:ext cx="485981" cy="1475858"/>
+            <a:off x="5790198" y="8120809"/>
+            <a:ext cx="543131" cy="1475858"/>
           </a:xfrm>
           <a:prstGeom prst="bentConnector3">
             <a:avLst>
@@ -7911,8 +7851,8 @@
         </p:nvCxnSpPr>
         <p:spPr>
           <a:xfrm rot="5400000" flipH="1" flipV="1">
-            <a:off x="4336703" y="8143244"/>
-            <a:ext cx="486053" cy="1488210"/>
+            <a:off x="4308128" y="8114669"/>
+            <a:ext cx="543203" cy="1488210"/>
           </a:xfrm>
           <a:prstGeom prst="bentConnector3">
             <a:avLst>
@@ -7959,12 +7899,12 @@
         </p:nvCxnSpPr>
         <p:spPr>
           <a:xfrm flipH="1" flipV="1">
-            <a:off x="5862430" y="5116760"/>
-            <a:ext cx="1670678" cy="9267916"/>
+            <a:off x="5862430" y="4399210"/>
+            <a:ext cx="1670678" cy="9985466"/>
           </a:xfrm>
           <a:prstGeom prst="bentConnector3">
             <a:avLst>
-              <a:gd name="adj1" fmla="val -20611"/>
+              <a:gd name="adj1" fmla="val -13683"/>
             </a:avLst>
           </a:prstGeom>
           <a:ln w="12700">
@@ -8003,7 +7943,7 @@
         </p:nvSpPr>
         <p:spPr>
           <a:xfrm>
-            <a:off x="6477691" y="4876594"/>
+            <a:off x="6477691" y="4159044"/>
             <a:ext cx="761245" cy="230832"/>
           </a:xfrm>
           <a:prstGeom prst="rect">
@@ -8048,7 +7988,7 @@
         </p:nvSpPr>
         <p:spPr>
           <a:xfrm>
-            <a:off x="4174722" y="7936069"/>
+            <a:off x="4174722" y="7878919"/>
             <a:ext cx="761245" cy="215444"/>
           </a:xfrm>
           <a:prstGeom prst="rect">
@@ -8095,6 +8035,174 @@
           </a:p>
         </p:txBody>
       </p:sp>
+      <p:sp>
+        <p:nvSpPr>
+          <p:cNvPr id="81" name="Rectangle: Rounded Corners 80">
+            <a:extLst>
+              <a:ext uri="{FF2B5EF4-FFF2-40B4-BE49-F238E27FC236}">
+                <a16:creationId xmlns:a16="http://schemas.microsoft.com/office/drawing/2014/main" id="{0680DED7-E511-420C-8EB5-86A5EAF4089C}"/>
+              </a:ext>
+            </a:extLst>
+          </p:cNvPr>
+          <p:cNvSpPr/>
+          <p:nvPr/>
+        </p:nvSpPr>
+        <p:spPr>
+          <a:xfrm>
+            <a:off x="4863582" y="6850290"/>
+            <a:ext cx="926281" cy="287953"/>
+          </a:xfrm>
+          <a:prstGeom prst="roundRect">
+            <a:avLst/>
+          </a:prstGeom>
+          <a:ln>
+            <a:headEnd type="none" w="med" len="med"/>
+            <a:tailEnd type="none" w="med" len="med"/>
+          </a:ln>
+        </p:spPr>
+        <p:style>
+          <a:lnRef idx="1">
+            <a:schemeClr val="accent1"/>
+          </a:lnRef>
+          <a:fillRef idx="2">
+            <a:schemeClr val="accent1"/>
+          </a:fillRef>
+          <a:effectRef idx="1">
+            <a:schemeClr val="accent1"/>
+          </a:effectRef>
+          <a:fontRef idx="minor">
+            <a:schemeClr val="dk1"/>
+          </a:fontRef>
+        </p:style>
+        <p:txBody>
+          <a:bodyPr rtlCol="0" anchor="ctr"/>
+          <a:lstStyle/>
+          <a:p>
+            <a:pPr algn="ctr"/>
+            <a:r>
+              <a:rPr lang="zh-CN" altLang="en-US" sz="1000" b="1" dirty="0">
+                <a:solidFill>
+                  <a:schemeClr val="tx1"/>
+                </a:solidFill>
+              </a:rPr>
+              <a:t>知识合并</a:t>
+            </a:r>
+            <a:endParaRPr lang="en-US" sz="1000" b="1" dirty="0">
+              <a:solidFill>
+                <a:schemeClr val="tx1"/>
+              </a:solidFill>
+            </a:endParaRPr>
+          </a:p>
+        </p:txBody>
+      </p:sp>
+      <p:sp>
+        <p:nvSpPr>
+          <p:cNvPr id="107" name="Rectangle: Rounded Corners 106">
+            <a:extLst>
+              <a:ext uri="{FF2B5EF4-FFF2-40B4-BE49-F238E27FC236}">
+                <a16:creationId xmlns:a16="http://schemas.microsoft.com/office/drawing/2014/main" id="{3E4A64AA-72F2-73BA-CF42-26609B7D383A}"/>
+              </a:ext>
+            </a:extLst>
+          </p:cNvPr>
+          <p:cNvSpPr/>
+          <p:nvPr/>
+        </p:nvSpPr>
+        <p:spPr>
+          <a:xfrm>
+            <a:off x="4806014" y="7425049"/>
+            <a:ext cx="1037486" cy="302748"/>
+          </a:xfrm>
+          <a:prstGeom prst="roundRect">
+            <a:avLst/>
+          </a:prstGeom>
+          <a:ln>
+            <a:headEnd type="none" w="med" len="med"/>
+            <a:tailEnd type="none" w="med" len="med"/>
+          </a:ln>
+        </p:spPr>
+        <p:style>
+          <a:lnRef idx="1">
+            <a:schemeClr val="accent2"/>
+          </a:lnRef>
+          <a:fillRef idx="2">
+            <a:schemeClr val="accent2"/>
+          </a:fillRef>
+          <a:effectRef idx="1">
+            <a:schemeClr val="accent2"/>
+          </a:effectRef>
+          <a:fontRef idx="minor">
+            <a:schemeClr val="dk1"/>
+          </a:fontRef>
+        </p:style>
+        <p:txBody>
+          <a:bodyPr rtlCol="0" anchor="ctr"/>
+          <a:lstStyle/>
+          <a:p>
+            <a:pPr algn="ctr"/>
+            <a:r>
+              <a:rPr lang="zh-CN" altLang="en-US" sz="1000" b="1" dirty="0">
+                <a:solidFill>
+                  <a:schemeClr val="tx1"/>
+                </a:solidFill>
+              </a:rPr>
+              <a:t>跨模态融合</a:t>
+            </a:r>
+            <a:endParaRPr lang="en-US" sz="1000" b="1" dirty="0">
+              <a:solidFill>
+                <a:schemeClr val="tx1"/>
+              </a:solidFill>
+            </a:endParaRPr>
+          </a:p>
+        </p:txBody>
+      </p:sp>
+      <p:cxnSp>
+        <p:nvCxnSpPr>
+          <p:cNvPr id="110" name="Connector: Elbow 109">
+            <a:extLst>
+              <a:ext uri="{FF2B5EF4-FFF2-40B4-BE49-F238E27FC236}">
+                <a16:creationId xmlns:a16="http://schemas.microsoft.com/office/drawing/2014/main" id="{CE77E762-D6A5-07DF-5DBC-212E20716623}"/>
+              </a:ext>
+            </a:extLst>
+          </p:cNvPr>
+          <p:cNvCxnSpPr>
+            <a:cxnSpLocks/>
+            <a:stCxn id="76" idx="0"/>
+            <a:endCxn id="107" idx="2"/>
+          </p:cNvCxnSpPr>
+          <p:nvPr/>
+        </p:nvCxnSpPr>
+        <p:spPr>
+          <a:xfrm rot="5400000" flipH="1" flipV="1">
+            <a:off x="5149491" y="7902141"/>
+            <a:ext cx="349609" cy="923"/>
+          </a:xfrm>
+          <a:prstGeom prst="bentConnector3">
+            <a:avLst>
+              <a:gd name="adj1" fmla="val 50000"/>
+            </a:avLst>
+          </a:prstGeom>
+          <a:ln w="12700">
+            <a:solidFill>
+              <a:srgbClr val="FF0000"/>
+            </a:solidFill>
+            <a:tailEnd type="triangle"/>
+          </a:ln>
+        </p:spPr>
+        <p:style>
+          <a:lnRef idx="1">
+            <a:schemeClr val="accent1"/>
+          </a:lnRef>
+          <a:fillRef idx="0">
+            <a:schemeClr val="accent1"/>
+          </a:fillRef>
+          <a:effectRef idx="0">
+            <a:schemeClr val="accent1"/>
+          </a:effectRef>
+          <a:fontRef idx="minor">
+            <a:schemeClr val="tx1"/>
+          </a:fontRef>
+        </p:style>
+      </p:cxnSp>
     </p:spTree>
     <p:extLst>
       <p:ext uri="{BB962C8B-B14F-4D97-AF65-F5344CB8AC3E}">

</xml_diff>